<commit_message>
add tree data structure
</commit_message>
<xml_diff>
--- a/Tree.pptx
+++ b/Tree.pptx
@@ -104,6 +104,11 @@
       </a:defRPr>
     </a:lvl9pPr>
   </p:defaultTextStyle>
+  <p:extLst>
+    <p:ext uri="{EFAFB233-063F-42B5-8137-9DF3F51BA10A}">
+      <p15:sldGuideLst xmlns:p15="http://schemas.microsoft.com/office/powerpoint/2012/main"/>
+    </p:ext>
+  </p:extLst>
 </p:presentation>
 </file>
 
@@ -254,7 +259,7 @@
           <a:p>
             <a:fld id="{1D6D366A-895B-49E7-923C-2FCE876D1A79}" type="datetimeFigureOut">
               <a:rPr lang="zh-CN" altLang="en-US" smtClean="0"/>
-              <a:t>2023/7/27</a:t>
+              <a:t>2023/7/28</a:t>
             </a:fld>
             <a:endParaRPr lang="zh-CN" altLang="en-US"/>
           </a:p>
@@ -452,7 +457,7 @@
           <a:p>
             <a:fld id="{1D6D366A-895B-49E7-923C-2FCE876D1A79}" type="datetimeFigureOut">
               <a:rPr lang="zh-CN" altLang="en-US" smtClean="0"/>
-              <a:t>2023/7/27</a:t>
+              <a:t>2023/7/28</a:t>
             </a:fld>
             <a:endParaRPr lang="zh-CN" altLang="en-US"/>
           </a:p>
@@ -660,7 +665,7 @@
           <a:p>
             <a:fld id="{1D6D366A-895B-49E7-923C-2FCE876D1A79}" type="datetimeFigureOut">
               <a:rPr lang="zh-CN" altLang="en-US" smtClean="0"/>
-              <a:t>2023/7/27</a:t>
+              <a:t>2023/7/28</a:t>
             </a:fld>
             <a:endParaRPr lang="zh-CN" altLang="en-US"/>
           </a:p>
@@ -858,7 +863,7 @@
           <a:p>
             <a:fld id="{1D6D366A-895B-49E7-923C-2FCE876D1A79}" type="datetimeFigureOut">
               <a:rPr lang="zh-CN" altLang="en-US" smtClean="0"/>
-              <a:t>2023/7/27</a:t>
+              <a:t>2023/7/28</a:t>
             </a:fld>
             <a:endParaRPr lang="zh-CN" altLang="en-US"/>
           </a:p>
@@ -1133,7 +1138,7 @@
           <a:p>
             <a:fld id="{1D6D366A-895B-49E7-923C-2FCE876D1A79}" type="datetimeFigureOut">
               <a:rPr lang="zh-CN" altLang="en-US" smtClean="0"/>
-              <a:t>2023/7/27</a:t>
+              <a:t>2023/7/28</a:t>
             </a:fld>
             <a:endParaRPr lang="zh-CN" altLang="en-US"/>
           </a:p>
@@ -1398,7 +1403,7 @@
           <a:p>
             <a:fld id="{1D6D366A-895B-49E7-923C-2FCE876D1A79}" type="datetimeFigureOut">
               <a:rPr lang="zh-CN" altLang="en-US" smtClean="0"/>
-              <a:t>2023/7/27</a:t>
+              <a:t>2023/7/28</a:t>
             </a:fld>
             <a:endParaRPr lang="zh-CN" altLang="en-US"/>
           </a:p>
@@ -1810,7 +1815,7 @@
           <a:p>
             <a:fld id="{1D6D366A-895B-49E7-923C-2FCE876D1A79}" type="datetimeFigureOut">
               <a:rPr lang="zh-CN" altLang="en-US" smtClean="0"/>
-              <a:t>2023/7/27</a:t>
+              <a:t>2023/7/28</a:t>
             </a:fld>
             <a:endParaRPr lang="zh-CN" altLang="en-US"/>
           </a:p>
@@ -1951,7 +1956,7 @@
           <a:p>
             <a:fld id="{1D6D366A-895B-49E7-923C-2FCE876D1A79}" type="datetimeFigureOut">
               <a:rPr lang="zh-CN" altLang="en-US" smtClean="0"/>
-              <a:t>2023/7/27</a:t>
+              <a:t>2023/7/28</a:t>
             </a:fld>
             <a:endParaRPr lang="zh-CN" altLang="en-US"/>
           </a:p>
@@ -2064,7 +2069,7 @@
           <a:p>
             <a:fld id="{1D6D366A-895B-49E7-923C-2FCE876D1A79}" type="datetimeFigureOut">
               <a:rPr lang="zh-CN" altLang="en-US" smtClean="0"/>
-              <a:t>2023/7/27</a:t>
+              <a:t>2023/7/28</a:t>
             </a:fld>
             <a:endParaRPr lang="zh-CN" altLang="en-US"/>
           </a:p>
@@ -2375,7 +2380,7 @@
           <a:p>
             <a:fld id="{1D6D366A-895B-49E7-923C-2FCE876D1A79}" type="datetimeFigureOut">
               <a:rPr lang="zh-CN" altLang="en-US" smtClean="0"/>
-              <a:t>2023/7/27</a:t>
+              <a:t>2023/7/28</a:t>
             </a:fld>
             <a:endParaRPr lang="zh-CN" altLang="en-US"/>
           </a:p>
@@ -2663,7 +2668,7 @@
           <a:p>
             <a:fld id="{1D6D366A-895B-49E7-923C-2FCE876D1A79}" type="datetimeFigureOut">
               <a:rPr lang="zh-CN" altLang="en-US" smtClean="0"/>
-              <a:t>2023/7/27</a:t>
+              <a:t>2023/7/28</a:t>
             </a:fld>
             <a:endParaRPr lang="zh-CN" altLang="en-US"/>
           </a:p>
@@ -2904,7 +2909,7 @@
           <a:p>
             <a:fld id="{1D6D366A-895B-49E7-923C-2FCE876D1A79}" type="datetimeFigureOut">
               <a:rPr lang="zh-CN" altLang="en-US" smtClean="0"/>
-              <a:t>2023/7/27</a:t>
+              <a:t>2023/7/28</a:t>
             </a:fld>
             <a:endParaRPr lang="zh-CN" altLang="en-US"/>
           </a:p>
@@ -14300,6 +14305,403 @@
           </a:fontRef>
         </p:style>
       </p:cxnSp>
+      <p:cxnSp>
+        <p:nvCxnSpPr>
+          <p:cNvPr id="36" name="连接符: 曲线 35">
+            <a:extLst>
+              <a:ext uri="{FF2B5EF4-FFF2-40B4-BE49-F238E27FC236}">
+                <a16:creationId xmlns:a16="http://schemas.microsoft.com/office/drawing/2014/main" id="{160D18FD-2D10-9636-5D8B-913EB173EFE7}"/>
+              </a:ext>
+            </a:extLst>
+          </p:cNvPr>
+          <p:cNvCxnSpPr/>
+          <p:nvPr/>
+        </p:nvCxnSpPr>
+        <p:spPr>
+          <a:xfrm rot="5400000">
+            <a:off x="520233" y="1141090"/>
+            <a:ext cx="1814834" cy="999995"/>
+          </a:xfrm>
+          <a:prstGeom prst="curvedConnector3">
+            <a:avLst/>
+          </a:prstGeom>
+          <a:ln>
+            <a:tailEnd type="triangle"/>
+          </a:ln>
+        </p:spPr>
+        <p:style>
+          <a:lnRef idx="1">
+            <a:schemeClr val="accent1"/>
+          </a:lnRef>
+          <a:fillRef idx="0">
+            <a:schemeClr val="accent1"/>
+          </a:fillRef>
+          <a:effectRef idx="0">
+            <a:schemeClr val="accent1"/>
+          </a:effectRef>
+          <a:fontRef idx="minor">
+            <a:schemeClr val="tx1"/>
+          </a:fontRef>
+        </p:style>
+      </p:cxnSp>
+      <p:cxnSp>
+        <p:nvCxnSpPr>
+          <p:cNvPr id="60" name="连接符: 曲线 59">
+            <a:extLst>
+              <a:ext uri="{FF2B5EF4-FFF2-40B4-BE49-F238E27FC236}">
+                <a16:creationId xmlns:a16="http://schemas.microsoft.com/office/drawing/2014/main" id="{E4B6D08A-A04B-AEEA-3241-A745B42311DA}"/>
+              </a:ext>
+            </a:extLst>
+          </p:cNvPr>
+          <p:cNvCxnSpPr/>
+          <p:nvPr/>
+        </p:nvCxnSpPr>
+        <p:spPr>
+          <a:xfrm rot="5400000">
+            <a:off x="564654" y="3066002"/>
+            <a:ext cx="725996" cy="12700"/>
+          </a:xfrm>
+          <a:prstGeom prst="curvedConnector3">
+            <a:avLst/>
+          </a:prstGeom>
+          <a:ln>
+            <a:tailEnd type="triangle"/>
+          </a:ln>
+        </p:spPr>
+        <p:style>
+          <a:lnRef idx="1">
+            <a:schemeClr val="accent1"/>
+          </a:lnRef>
+          <a:fillRef idx="0">
+            <a:schemeClr val="accent1"/>
+          </a:fillRef>
+          <a:effectRef idx="0">
+            <a:schemeClr val="accent1"/>
+          </a:effectRef>
+          <a:fontRef idx="minor">
+            <a:schemeClr val="tx1"/>
+          </a:fontRef>
+        </p:style>
+      </p:cxnSp>
+      <p:cxnSp>
+        <p:nvCxnSpPr>
+          <p:cNvPr id="91" name="连接符: 曲线 90">
+            <a:extLst>
+              <a:ext uri="{FF2B5EF4-FFF2-40B4-BE49-F238E27FC236}">
+                <a16:creationId xmlns:a16="http://schemas.microsoft.com/office/drawing/2014/main" id="{082136BC-B835-DAAC-E4F0-627CF4509240}"/>
+              </a:ext>
+            </a:extLst>
+          </p:cNvPr>
+          <p:cNvCxnSpPr/>
+          <p:nvPr/>
+        </p:nvCxnSpPr>
+        <p:spPr>
+          <a:xfrm rot="5400000" flipH="1" flipV="1">
+            <a:off x="828070" y="3017764"/>
+            <a:ext cx="517168" cy="305305"/>
+          </a:xfrm>
+          <a:prstGeom prst="curvedConnector3">
+            <a:avLst/>
+          </a:prstGeom>
+          <a:ln>
+            <a:tailEnd type="triangle"/>
+          </a:ln>
+        </p:spPr>
+        <p:style>
+          <a:lnRef idx="1">
+            <a:schemeClr val="accent1"/>
+          </a:lnRef>
+          <a:fillRef idx="0">
+            <a:schemeClr val="accent1"/>
+          </a:fillRef>
+          <a:effectRef idx="0">
+            <a:schemeClr val="accent1"/>
+          </a:effectRef>
+          <a:fontRef idx="minor">
+            <a:schemeClr val="tx1"/>
+          </a:fontRef>
+        </p:style>
+      </p:cxnSp>
+      <p:cxnSp>
+        <p:nvCxnSpPr>
+          <p:cNvPr id="147" name="连接符: 曲线 146">
+            <a:extLst>
+              <a:ext uri="{FF2B5EF4-FFF2-40B4-BE49-F238E27FC236}">
+                <a16:creationId xmlns:a16="http://schemas.microsoft.com/office/drawing/2014/main" id="{FA140591-6026-8428-F368-4CC2F813A9D2}"/>
+              </a:ext>
+            </a:extLst>
+          </p:cNvPr>
+          <p:cNvCxnSpPr/>
+          <p:nvPr/>
+        </p:nvCxnSpPr>
+        <p:spPr>
+          <a:xfrm rot="16200000" flipH="1">
+            <a:off x="1161030" y="3167403"/>
+            <a:ext cx="669550" cy="175343"/>
+          </a:xfrm>
+          <a:prstGeom prst="curvedConnector3">
+            <a:avLst/>
+          </a:prstGeom>
+          <a:ln>
+            <a:tailEnd type="triangle"/>
+          </a:ln>
+        </p:spPr>
+        <p:style>
+          <a:lnRef idx="1">
+            <a:schemeClr val="accent1"/>
+          </a:lnRef>
+          <a:fillRef idx="0">
+            <a:schemeClr val="accent1"/>
+          </a:fillRef>
+          <a:effectRef idx="0">
+            <a:schemeClr val="accent1"/>
+          </a:effectRef>
+          <a:fontRef idx="minor">
+            <a:schemeClr val="tx1"/>
+          </a:fontRef>
+        </p:style>
+      </p:cxnSp>
+      <p:cxnSp>
+        <p:nvCxnSpPr>
+          <p:cNvPr id="149" name="连接符: 曲线 148">
+            <a:extLst>
+              <a:ext uri="{FF2B5EF4-FFF2-40B4-BE49-F238E27FC236}">
+                <a16:creationId xmlns:a16="http://schemas.microsoft.com/office/drawing/2014/main" id="{8B8DF9EB-1A05-ADB8-683D-B2FB30B76072}"/>
+              </a:ext>
+            </a:extLst>
+          </p:cNvPr>
+          <p:cNvCxnSpPr/>
+          <p:nvPr/>
+        </p:nvCxnSpPr>
+        <p:spPr>
+          <a:xfrm rot="16200000" flipV="1">
+            <a:off x="1242684" y="3128045"/>
+            <a:ext cx="789899" cy="133712"/>
+          </a:xfrm>
+          <a:prstGeom prst="curvedConnector3">
+            <a:avLst/>
+          </a:prstGeom>
+          <a:ln>
+            <a:tailEnd type="triangle"/>
+          </a:ln>
+        </p:spPr>
+        <p:style>
+          <a:lnRef idx="1">
+            <a:schemeClr val="accent1"/>
+          </a:lnRef>
+          <a:fillRef idx="0">
+            <a:schemeClr val="accent1"/>
+          </a:fillRef>
+          <a:effectRef idx="0">
+            <a:schemeClr val="accent1"/>
+          </a:effectRef>
+          <a:fontRef idx="minor">
+            <a:schemeClr val="tx1"/>
+          </a:fontRef>
+        </p:style>
+      </p:cxnSp>
+      <p:cxnSp>
+        <p:nvCxnSpPr>
+          <p:cNvPr id="151" name="连接符: 曲线 150">
+            <a:extLst>
+              <a:ext uri="{FF2B5EF4-FFF2-40B4-BE49-F238E27FC236}">
+                <a16:creationId xmlns:a16="http://schemas.microsoft.com/office/drawing/2014/main" id="{0B0C556E-3BD0-8537-A9C6-90E3E9A615F3}"/>
+              </a:ext>
+            </a:extLst>
+          </p:cNvPr>
+          <p:cNvCxnSpPr/>
+          <p:nvPr/>
+        </p:nvCxnSpPr>
+        <p:spPr>
+          <a:xfrm rot="5400000" flipH="1" flipV="1">
+            <a:off x="1532756" y="2480436"/>
+            <a:ext cx="158714" cy="12700"/>
+          </a:xfrm>
+          <a:prstGeom prst="curvedConnector3">
+            <a:avLst/>
+          </a:prstGeom>
+          <a:ln>
+            <a:tailEnd type="triangle"/>
+          </a:ln>
+        </p:spPr>
+        <p:style>
+          <a:lnRef idx="1">
+            <a:schemeClr val="accent1"/>
+          </a:lnRef>
+          <a:fillRef idx="0">
+            <a:schemeClr val="accent1"/>
+          </a:fillRef>
+          <a:effectRef idx="0">
+            <a:schemeClr val="accent1"/>
+          </a:effectRef>
+          <a:fontRef idx="minor">
+            <a:schemeClr val="tx1"/>
+          </a:fontRef>
+        </p:style>
+      </p:cxnSp>
+      <p:cxnSp>
+        <p:nvCxnSpPr>
+          <p:cNvPr id="180" name="连接符: 曲线 179">
+            <a:extLst>
+              <a:ext uri="{FF2B5EF4-FFF2-40B4-BE49-F238E27FC236}">
+                <a16:creationId xmlns:a16="http://schemas.microsoft.com/office/drawing/2014/main" id="{EDAB6357-B43B-4FD0-EFF7-755484C0BE27}"/>
+              </a:ext>
+            </a:extLst>
+          </p:cNvPr>
+          <p:cNvCxnSpPr/>
+          <p:nvPr/>
+        </p:nvCxnSpPr>
+        <p:spPr>
+          <a:xfrm rot="5400000" flipH="1" flipV="1">
+            <a:off x="1979600" y="1451954"/>
+            <a:ext cx="396253" cy="110840"/>
+          </a:xfrm>
+          <a:prstGeom prst="curvedConnector3">
+            <a:avLst/>
+          </a:prstGeom>
+          <a:ln>
+            <a:tailEnd type="triangle"/>
+          </a:ln>
+        </p:spPr>
+        <p:style>
+          <a:lnRef idx="1">
+            <a:schemeClr val="accent1"/>
+          </a:lnRef>
+          <a:fillRef idx="0">
+            <a:schemeClr val="accent1"/>
+          </a:fillRef>
+          <a:effectRef idx="0">
+            <a:schemeClr val="accent1"/>
+          </a:effectRef>
+          <a:fontRef idx="minor">
+            <a:schemeClr val="tx1"/>
+          </a:fontRef>
+        </p:style>
+      </p:cxnSp>
+      <p:cxnSp>
+        <p:nvCxnSpPr>
+          <p:cNvPr id="182" name="连接符: 曲线 181">
+            <a:extLst>
+              <a:ext uri="{FF2B5EF4-FFF2-40B4-BE49-F238E27FC236}">
+                <a16:creationId xmlns:a16="http://schemas.microsoft.com/office/drawing/2014/main" id="{F35D0126-A425-625D-25C6-35344A76D16F}"/>
+              </a:ext>
+            </a:extLst>
+          </p:cNvPr>
+          <p:cNvCxnSpPr>
+            <a:endCxn id="26" idx="6"/>
+          </p:cNvCxnSpPr>
+          <p:nvPr/>
+        </p:nvCxnSpPr>
+        <p:spPr>
+          <a:xfrm rot="16200000" flipH="1">
+            <a:off x="2569767" y="1263026"/>
+            <a:ext cx="365677" cy="70933"/>
+          </a:xfrm>
+          <a:prstGeom prst="curvedConnector4">
+            <a:avLst>
+              <a:gd name="adj1" fmla="val 26470"/>
+              <a:gd name="adj2" fmla="val 422276"/>
+            </a:avLst>
+          </a:prstGeom>
+          <a:ln>
+            <a:tailEnd type="triangle"/>
+          </a:ln>
+        </p:spPr>
+        <p:style>
+          <a:lnRef idx="1">
+            <a:schemeClr val="accent1"/>
+          </a:lnRef>
+          <a:fillRef idx="0">
+            <a:schemeClr val="accent1"/>
+          </a:fillRef>
+          <a:effectRef idx="0">
+            <a:schemeClr val="accent1"/>
+          </a:effectRef>
+          <a:fontRef idx="minor">
+            <a:schemeClr val="tx1"/>
+          </a:fontRef>
+        </p:style>
+      </p:cxnSp>
+      <p:cxnSp>
+        <p:nvCxnSpPr>
+          <p:cNvPr id="184" name="连接符: 曲线 183">
+            <a:extLst>
+              <a:ext uri="{FF2B5EF4-FFF2-40B4-BE49-F238E27FC236}">
+                <a16:creationId xmlns:a16="http://schemas.microsoft.com/office/drawing/2014/main" id="{530E1730-F696-A272-2AB0-22546239B369}"/>
+              </a:ext>
+            </a:extLst>
+          </p:cNvPr>
+          <p:cNvCxnSpPr/>
+          <p:nvPr/>
+        </p:nvCxnSpPr>
+        <p:spPr>
+          <a:xfrm rot="5400000">
+            <a:off x="2500109" y="1921997"/>
+            <a:ext cx="187167" cy="57560"/>
+          </a:xfrm>
+          <a:prstGeom prst="curvedConnector3">
+            <a:avLst/>
+          </a:prstGeom>
+          <a:ln>
+            <a:tailEnd type="triangle"/>
+          </a:ln>
+        </p:spPr>
+        <p:style>
+          <a:lnRef idx="1">
+            <a:schemeClr val="accent1"/>
+          </a:lnRef>
+          <a:fillRef idx="0">
+            <a:schemeClr val="accent1"/>
+          </a:fillRef>
+          <a:effectRef idx="0">
+            <a:schemeClr val="accent1"/>
+          </a:effectRef>
+          <a:fontRef idx="minor">
+            <a:schemeClr val="tx1"/>
+          </a:fontRef>
+        </p:style>
+      </p:cxnSp>
+      <p:cxnSp>
+        <p:nvCxnSpPr>
+          <p:cNvPr id="190" name="连接符: 曲线 189">
+            <a:extLst>
+              <a:ext uri="{FF2B5EF4-FFF2-40B4-BE49-F238E27FC236}">
+                <a16:creationId xmlns:a16="http://schemas.microsoft.com/office/drawing/2014/main" id="{974DB487-E4A2-25DC-25EA-5B1A4B7F3CFC}"/>
+              </a:ext>
+            </a:extLst>
+          </p:cNvPr>
+          <p:cNvCxnSpPr>
+            <a:endCxn id="18" idx="1"/>
+          </p:cNvCxnSpPr>
+          <p:nvPr/>
+        </p:nvCxnSpPr>
+        <p:spPr>
+          <a:xfrm rot="16200000" flipH="1">
+            <a:off x="2450257" y="2298577"/>
+            <a:ext cx="166716" cy="18309"/>
+          </a:xfrm>
+          <a:prstGeom prst="curvedConnector3">
+            <a:avLst/>
+          </a:prstGeom>
+          <a:ln>
+            <a:tailEnd type="triangle"/>
+          </a:ln>
+        </p:spPr>
+        <p:style>
+          <a:lnRef idx="1">
+            <a:schemeClr val="accent1"/>
+          </a:lnRef>
+          <a:fillRef idx="0">
+            <a:schemeClr val="accent1"/>
+          </a:fillRef>
+          <a:effectRef idx="0">
+            <a:schemeClr val="accent1"/>
+          </a:effectRef>
+          <a:fontRef idx="minor">
+            <a:schemeClr val="tx1"/>
+          </a:fontRef>
+        </p:style>
+      </p:cxnSp>
     </p:spTree>
     <p:extLst>
       <p:ext uri="{BB962C8B-B14F-4D97-AF65-F5344CB8AC3E}">

</xml_diff>